<commit_message>
- added zoom-icons - unified the style of the plot-settings/channel-selection panels to use a toolbar --> now the spectroscopy plot is similar to the scan-image plot
</commit_message>
<xml_diff>
--- a/artwork/icons/MyOwnIcons.pptx
+++ b/artwork/icons/MyOwnIcons.pptx
@@ -305,7 +305,7 @@
           <a:p>
             <a:fld id="{F70BA417-99DB-4411-8639-E044FED67668}" type="datetimeFigureOut">
               <a:rPr lang="en-US" smtClean="0"/>
-              <a:t>12/16/2015</a:t>
+              <a:t>1/19/2016</a:t>
             </a:fld>
             <a:endParaRPr lang="en-US"/>
           </a:p>
@@ -475,7 +475,7 @@
           <a:p>
             <a:fld id="{F70BA417-99DB-4411-8639-E044FED67668}" type="datetimeFigureOut">
               <a:rPr lang="en-US" smtClean="0"/>
-              <a:t>12/16/2015</a:t>
+              <a:t>1/19/2016</a:t>
             </a:fld>
             <a:endParaRPr lang="en-US"/>
           </a:p>
@@ -655,7 +655,7 @@
           <a:p>
             <a:fld id="{F70BA417-99DB-4411-8639-E044FED67668}" type="datetimeFigureOut">
               <a:rPr lang="en-US" smtClean="0"/>
-              <a:t>12/16/2015</a:t>
+              <a:t>1/19/2016</a:t>
             </a:fld>
             <a:endParaRPr lang="en-US"/>
           </a:p>
@@ -825,7 +825,7 @@
           <a:p>
             <a:fld id="{F70BA417-99DB-4411-8639-E044FED67668}" type="datetimeFigureOut">
               <a:rPr lang="en-US" smtClean="0"/>
-              <a:t>12/16/2015</a:t>
+              <a:t>1/19/2016</a:t>
             </a:fld>
             <a:endParaRPr lang="en-US"/>
           </a:p>
@@ -1071,7 +1071,7 @@
           <a:p>
             <a:fld id="{F70BA417-99DB-4411-8639-E044FED67668}" type="datetimeFigureOut">
               <a:rPr lang="en-US" smtClean="0"/>
-              <a:t>12/16/2015</a:t>
+              <a:t>1/19/2016</a:t>
             </a:fld>
             <a:endParaRPr lang="en-US"/>
           </a:p>
@@ -1359,7 +1359,7 @@
           <a:p>
             <a:fld id="{F70BA417-99DB-4411-8639-E044FED67668}" type="datetimeFigureOut">
               <a:rPr lang="en-US" smtClean="0"/>
-              <a:t>12/16/2015</a:t>
+              <a:t>1/19/2016</a:t>
             </a:fld>
             <a:endParaRPr lang="en-US"/>
           </a:p>
@@ -1781,7 +1781,7 @@
           <a:p>
             <a:fld id="{F70BA417-99DB-4411-8639-E044FED67668}" type="datetimeFigureOut">
               <a:rPr lang="en-US" smtClean="0"/>
-              <a:t>12/16/2015</a:t>
+              <a:t>1/19/2016</a:t>
             </a:fld>
             <a:endParaRPr lang="en-US"/>
           </a:p>
@@ -1899,7 +1899,7 @@
           <a:p>
             <a:fld id="{F70BA417-99DB-4411-8639-E044FED67668}" type="datetimeFigureOut">
               <a:rPr lang="en-US" smtClean="0"/>
-              <a:t>12/16/2015</a:t>
+              <a:t>1/19/2016</a:t>
             </a:fld>
             <a:endParaRPr lang="en-US"/>
           </a:p>
@@ -1994,7 +1994,7 @@
           <a:p>
             <a:fld id="{F70BA417-99DB-4411-8639-E044FED67668}" type="datetimeFigureOut">
               <a:rPr lang="en-US" smtClean="0"/>
-              <a:t>12/16/2015</a:t>
+              <a:t>1/19/2016</a:t>
             </a:fld>
             <a:endParaRPr lang="en-US"/>
           </a:p>
@@ -2271,7 +2271,7 @@
           <a:p>
             <a:fld id="{F70BA417-99DB-4411-8639-E044FED67668}" type="datetimeFigureOut">
               <a:rPr lang="en-US" smtClean="0"/>
-              <a:t>12/16/2015</a:t>
+              <a:t>1/19/2016</a:t>
             </a:fld>
             <a:endParaRPr lang="en-US"/>
           </a:p>
@@ -2524,7 +2524,7 @@
           <a:p>
             <a:fld id="{F70BA417-99DB-4411-8639-E044FED67668}" type="datetimeFigureOut">
               <a:rPr lang="en-US" smtClean="0"/>
-              <a:t>12/16/2015</a:t>
+              <a:t>1/19/2016</a:t>
             </a:fld>
             <a:endParaRPr lang="en-US"/>
           </a:p>
@@ -2737,7 +2737,7 @@
           <a:p>
             <a:fld id="{F70BA417-99DB-4411-8639-E044FED67668}" type="datetimeFigureOut">
               <a:rPr lang="en-US" smtClean="0"/>
-              <a:t>12/16/2015</a:t>
+              <a:t>1/19/2016</a:t>
             </a:fld>
             <a:endParaRPr lang="en-US"/>
           </a:p>
@@ -17764,6 +17764,416 @@
           </p:txBody>
         </p:sp>
       </p:grpSp>
+      <p:grpSp>
+        <p:nvGrpSpPr>
+          <p:cNvPr id="8" name="Gruppieren 7"/>
+          <p:cNvGrpSpPr/>
+          <p:nvPr/>
+        </p:nvGrpSpPr>
+        <p:grpSpPr>
+          <a:xfrm>
+            <a:off x="3641182" y="4822016"/>
+            <a:ext cx="454865" cy="462590"/>
+            <a:chOff x="3641182" y="4822016"/>
+            <a:chExt cx="454865" cy="462590"/>
+          </a:xfrm>
+        </p:grpSpPr>
+        <p:cxnSp>
+          <p:nvCxnSpPr>
+            <p:cNvPr id="116" name="Straight Connector 15"/>
+            <p:cNvCxnSpPr/>
+            <p:nvPr/>
+          </p:nvCxnSpPr>
+          <p:spPr>
+            <a:xfrm flipH="1">
+              <a:off x="3641182" y="5088724"/>
+              <a:ext cx="193737" cy="195882"/>
+            </a:xfrm>
+            <a:prstGeom prst="line">
+              <a:avLst/>
+            </a:prstGeom>
+            <a:ln w="127000" cap="rnd">
+              <a:solidFill>
+                <a:schemeClr val="tx1"/>
+              </a:solidFill>
+            </a:ln>
+          </p:spPr>
+          <p:style>
+            <a:lnRef idx="1">
+              <a:schemeClr val="accent1"/>
+            </a:lnRef>
+            <a:fillRef idx="0">
+              <a:schemeClr val="accent1"/>
+            </a:fillRef>
+            <a:effectRef idx="0">
+              <a:schemeClr val="accent1"/>
+            </a:effectRef>
+            <a:fontRef idx="minor">
+              <a:schemeClr val="tx1"/>
+            </a:fontRef>
+          </p:style>
+        </p:cxnSp>
+        <p:sp>
+          <p:nvSpPr>
+            <p:cNvPr id="7" name="Ellipse 6"/>
+            <p:cNvSpPr/>
+            <p:nvPr/>
+          </p:nvSpPr>
+          <p:spPr>
+            <a:xfrm>
+              <a:off x="3816835" y="4822016"/>
+              <a:ext cx="279212" cy="279212"/>
+            </a:xfrm>
+            <a:prstGeom prst="ellipse">
+              <a:avLst/>
+            </a:prstGeom>
+            <a:noFill/>
+            <a:ln w="76200">
+              <a:solidFill>
+                <a:srgbClr val="000000"/>
+              </a:solidFill>
+            </a:ln>
+          </p:spPr>
+          <p:style>
+            <a:lnRef idx="2">
+              <a:schemeClr val="accent1">
+                <a:shade val="50000"/>
+              </a:schemeClr>
+            </a:lnRef>
+            <a:fillRef idx="1">
+              <a:schemeClr val="accent1"/>
+            </a:fillRef>
+            <a:effectRef idx="0">
+              <a:schemeClr val="accent1"/>
+            </a:effectRef>
+            <a:fontRef idx="minor">
+              <a:schemeClr val="lt1"/>
+            </a:fontRef>
+          </p:style>
+          <p:txBody>
+            <a:bodyPr rtlCol="0" anchor="ctr"/>
+            <a:lstStyle/>
+            <a:p>
+              <a:pPr algn="ctr"/>
+              <a:endParaRPr lang="en-US"/>
+            </a:p>
+          </p:txBody>
+        </p:sp>
+      </p:grpSp>
+      <p:grpSp>
+        <p:nvGrpSpPr>
+          <p:cNvPr id="10" name="Gruppieren 9"/>
+          <p:cNvGrpSpPr/>
+          <p:nvPr/>
+        </p:nvGrpSpPr>
+        <p:grpSpPr>
+          <a:xfrm>
+            <a:off x="3659636" y="5603929"/>
+            <a:ext cx="471684" cy="561375"/>
+            <a:chOff x="3659636" y="5501073"/>
+            <a:chExt cx="471684" cy="561375"/>
+          </a:xfrm>
+        </p:grpSpPr>
+        <p:grpSp>
+          <p:nvGrpSpPr>
+            <p:cNvPr id="121" name="Gruppieren 120"/>
+            <p:cNvGrpSpPr/>
+            <p:nvPr/>
+          </p:nvGrpSpPr>
+          <p:grpSpPr>
+            <a:xfrm>
+              <a:off x="3659636" y="5501073"/>
+              <a:ext cx="454865" cy="462590"/>
+              <a:chOff x="3641182" y="4822016"/>
+              <a:chExt cx="454865" cy="462590"/>
+            </a:xfrm>
+          </p:grpSpPr>
+          <p:cxnSp>
+            <p:nvCxnSpPr>
+              <p:cNvPr id="123" name="Straight Connector 15"/>
+              <p:cNvCxnSpPr/>
+              <p:nvPr/>
+            </p:nvCxnSpPr>
+            <p:spPr>
+              <a:xfrm flipH="1">
+                <a:off x="3641182" y="5088724"/>
+                <a:ext cx="193737" cy="195882"/>
+              </a:xfrm>
+              <a:prstGeom prst="line">
+                <a:avLst/>
+              </a:prstGeom>
+              <a:ln w="127000" cap="rnd">
+                <a:solidFill>
+                  <a:schemeClr val="tx1"/>
+                </a:solidFill>
+              </a:ln>
+            </p:spPr>
+            <p:style>
+              <a:lnRef idx="1">
+                <a:schemeClr val="accent1"/>
+              </a:lnRef>
+              <a:fillRef idx="0">
+                <a:schemeClr val="accent1"/>
+              </a:fillRef>
+              <a:effectRef idx="0">
+                <a:schemeClr val="accent1"/>
+              </a:effectRef>
+              <a:fontRef idx="minor">
+                <a:schemeClr val="tx1"/>
+              </a:fontRef>
+            </p:style>
+          </p:cxnSp>
+          <p:sp>
+            <p:nvSpPr>
+              <p:cNvPr id="126" name="Ellipse 125"/>
+              <p:cNvSpPr/>
+              <p:nvPr/>
+            </p:nvSpPr>
+            <p:spPr>
+              <a:xfrm>
+                <a:off x="3816835" y="4822016"/>
+                <a:ext cx="279212" cy="279212"/>
+              </a:xfrm>
+              <a:prstGeom prst="ellipse">
+                <a:avLst/>
+              </a:prstGeom>
+              <a:noFill/>
+              <a:ln w="76200">
+                <a:solidFill>
+                  <a:srgbClr val="000000"/>
+                </a:solidFill>
+              </a:ln>
+            </p:spPr>
+            <p:style>
+              <a:lnRef idx="2">
+                <a:schemeClr val="accent1">
+                  <a:shade val="50000"/>
+                </a:schemeClr>
+              </a:lnRef>
+              <a:fillRef idx="1">
+                <a:schemeClr val="accent1"/>
+              </a:fillRef>
+              <a:effectRef idx="0">
+                <a:schemeClr val="accent1"/>
+              </a:effectRef>
+              <a:fontRef idx="minor">
+                <a:schemeClr val="lt1"/>
+              </a:fontRef>
+            </p:style>
+            <p:txBody>
+              <a:bodyPr rtlCol="0" anchor="ctr"/>
+              <a:lstStyle/>
+              <a:p>
+                <a:pPr algn="ctr"/>
+                <a:endParaRPr lang="en-US"/>
+              </a:p>
+            </p:txBody>
+          </p:sp>
+        </p:grpSp>
+        <p:sp>
+          <p:nvSpPr>
+            <p:cNvPr id="9" name="Plus 8"/>
+            <p:cNvSpPr/>
+            <p:nvPr/>
+          </p:nvSpPr>
+          <p:spPr>
+            <a:xfrm>
+              <a:off x="3864612" y="5795740"/>
+              <a:ext cx="266708" cy="266708"/>
+            </a:xfrm>
+            <a:prstGeom prst="mathPlus">
+              <a:avLst/>
+            </a:prstGeom>
+            <a:solidFill>
+              <a:srgbClr val="000000"/>
+            </a:solidFill>
+            <a:ln>
+              <a:noFill/>
+            </a:ln>
+          </p:spPr>
+          <p:style>
+            <a:lnRef idx="2">
+              <a:schemeClr val="accent1">
+                <a:shade val="50000"/>
+              </a:schemeClr>
+            </a:lnRef>
+            <a:fillRef idx="1">
+              <a:schemeClr val="accent1"/>
+            </a:fillRef>
+            <a:effectRef idx="0">
+              <a:schemeClr val="accent1"/>
+            </a:effectRef>
+            <a:fontRef idx="minor">
+              <a:schemeClr val="lt1"/>
+            </a:fontRef>
+          </p:style>
+          <p:txBody>
+            <a:bodyPr rtlCol="0" anchor="ctr"/>
+            <a:lstStyle/>
+            <a:p>
+              <a:pPr algn="ctr"/>
+              <a:endParaRPr lang="en-US"/>
+            </a:p>
+          </p:txBody>
+        </p:sp>
+      </p:grpSp>
+      <p:grpSp>
+        <p:nvGrpSpPr>
+          <p:cNvPr id="14" name="Gruppieren 13"/>
+          <p:cNvGrpSpPr/>
+          <p:nvPr/>
+        </p:nvGrpSpPr>
+        <p:grpSpPr>
+          <a:xfrm>
+            <a:off x="4296127" y="5589240"/>
+            <a:ext cx="454865" cy="556689"/>
+            <a:chOff x="4296127" y="5589240"/>
+            <a:chExt cx="454865" cy="556689"/>
+          </a:xfrm>
+        </p:grpSpPr>
+        <p:grpSp>
+          <p:nvGrpSpPr>
+            <p:cNvPr id="128" name="Gruppieren 127"/>
+            <p:cNvGrpSpPr/>
+            <p:nvPr/>
+          </p:nvGrpSpPr>
+          <p:grpSpPr>
+            <a:xfrm>
+              <a:off x="4296127" y="5589240"/>
+              <a:ext cx="454865" cy="462590"/>
+              <a:chOff x="3641182" y="4822016"/>
+              <a:chExt cx="454865" cy="462590"/>
+            </a:xfrm>
+          </p:grpSpPr>
+          <p:cxnSp>
+            <p:nvCxnSpPr>
+              <p:cNvPr id="130" name="Straight Connector 15"/>
+              <p:cNvCxnSpPr/>
+              <p:nvPr/>
+            </p:nvCxnSpPr>
+            <p:spPr>
+              <a:xfrm flipH="1">
+                <a:off x="3641182" y="5088724"/>
+                <a:ext cx="193737" cy="195882"/>
+              </a:xfrm>
+              <a:prstGeom prst="line">
+                <a:avLst/>
+              </a:prstGeom>
+              <a:ln w="127000" cap="rnd">
+                <a:solidFill>
+                  <a:schemeClr val="tx1"/>
+                </a:solidFill>
+              </a:ln>
+            </p:spPr>
+            <p:style>
+              <a:lnRef idx="1">
+                <a:schemeClr val="accent1"/>
+              </a:lnRef>
+              <a:fillRef idx="0">
+                <a:schemeClr val="accent1"/>
+              </a:fillRef>
+              <a:effectRef idx="0">
+                <a:schemeClr val="accent1"/>
+              </a:effectRef>
+              <a:fontRef idx="minor">
+                <a:schemeClr val="tx1"/>
+              </a:fontRef>
+            </p:style>
+          </p:cxnSp>
+          <p:sp>
+            <p:nvSpPr>
+              <p:cNvPr id="131" name="Ellipse 130"/>
+              <p:cNvSpPr/>
+              <p:nvPr/>
+            </p:nvSpPr>
+            <p:spPr>
+              <a:xfrm>
+                <a:off x="3816835" y="4822016"/>
+                <a:ext cx="279212" cy="279212"/>
+              </a:xfrm>
+              <a:prstGeom prst="ellipse">
+                <a:avLst/>
+              </a:prstGeom>
+              <a:noFill/>
+              <a:ln w="76200">
+                <a:solidFill>
+                  <a:srgbClr val="000000"/>
+                </a:solidFill>
+              </a:ln>
+            </p:spPr>
+            <p:style>
+              <a:lnRef idx="2">
+                <a:schemeClr val="accent1">
+                  <a:shade val="50000"/>
+                </a:schemeClr>
+              </a:lnRef>
+              <a:fillRef idx="1">
+                <a:schemeClr val="accent1"/>
+              </a:fillRef>
+              <a:effectRef idx="0">
+                <a:schemeClr val="accent1"/>
+              </a:effectRef>
+              <a:fontRef idx="minor">
+                <a:schemeClr val="lt1"/>
+              </a:fontRef>
+            </p:style>
+            <p:txBody>
+              <a:bodyPr rtlCol="0" anchor="ctr"/>
+              <a:lstStyle/>
+              <a:p>
+                <a:pPr algn="ctr"/>
+                <a:endParaRPr lang="en-US"/>
+              </a:p>
+            </p:txBody>
+          </p:sp>
+        </p:grpSp>
+        <p:sp>
+          <p:nvSpPr>
+            <p:cNvPr id="13" name="Minus 12"/>
+            <p:cNvSpPr/>
+            <p:nvPr/>
+          </p:nvSpPr>
+          <p:spPr>
+            <a:xfrm>
+              <a:off x="4499992" y="5917971"/>
+              <a:ext cx="227958" cy="227958"/>
+            </a:xfrm>
+            <a:prstGeom prst="mathMinus">
+              <a:avLst/>
+            </a:prstGeom>
+            <a:solidFill>
+              <a:srgbClr val="000000"/>
+            </a:solidFill>
+            <a:ln>
+              <a:noFill/>
+            </a:ln>
+          </p:spPr>
+          <p:style>
+            <a:lnRef idx="2">
+              <a:schemeClr val="accent1">
+                <a:shade val="50000"/>
+              </a:schemeClr>
+            </a:lnRef>
+            <a:fillRef idx="1">
+              <a:schemeClr val="accent1"/>
+            </a:fillRef>
+            <a:effectRef idx="0">
+              <a:schemeClr val="accent1"/>
+            </a:effectRef>
+            <a:fontRef idx="minor">
+              <a:schemeClr val="lt1"/>
+            </a:fontRef>
+          </p:style>
+          <p:txBody>
+            <a:bodyPr rtlCol="0" anchor="ctr"/>
+            <a:lstStyle/>
+            <a:p>
+              <a:pPr algn="ctr"/>
+              <a:endParaRPr lang="en-US"/>
+            </a:p>
+          </p:txBody>
+        </p:sp>
+      </p:grpSp>
     </p:spTree>
     <p:extLst>
       <p:ext uri="{BB962C8B-B14F-4D97-AF65-F5344CB8AC3E}">

</xml_diff>

<commit_message>
[new] * SpectraFox file format (.sfd) * export possibility of grid spectra to SFD files * separate data explorer for grid files
</commit_message>
<xml_diff>
--- a/artwork/icons/MyOwnIcons.pptx
+++ b/artwork/icons/MyOwnIcons.pptx
@@ -305,7 +305,7 @@
           <a:p>
             <a:fld id="{F70BA417-99DB-4411-8639-E044FED67668}" type="datetimeFigureOut">
               <a:rPr lang="en-US" smtClean="0"/>
-              <a:t>5/15/2016</a:t>
+              <a:t>3/30/2017</a:t>
             </a:fld>
             <a:endParaRPr lang="en-US"/>
           </a:p>
@@ -475,7 +475,7 @@
           <a:p>
             <a:fld id="{F70BA417-99DB-4411-8639-E044FED67668}" type="datetimeFigureOut">
               <a:rPr lang="en-US" smtClean="0"/>
-              <a:t>5/15/2016</a:t>
+              <a:t>3/30/2017</a:t>
             </a:fld>
             <a:endParaRPr lang="en-US"/>
           </a:p>
@@ -655,7 +655,7 @@
           <a:p>
             <a:fld id="{F70BA417-99DB-4411-8639-E044FED67668}" type="datetimeFigureOut">
               <a:rPr lang="en-US" smtClean="0"/>
-              <a:t>5/15/2016</a:t>
+              <a:t>3/30/2017</a:t>
             </a:fld>
             <a:endParaRPr lang="en-US"/>
           </a:p>
@@ -825,7 +825,7 @@
           <a:p>
             <a:fld id="{F70BA417-99DB-4411-8639-E044FED67668}" type="datetimeFigureOut">
               <a:rPr lang="en-US" smtClean="0"/>
-              <a:t>5/15/2016</a:t>
+              <a:t>3/30/2017</a:t>
             </a:fld>
             <a:endParaRPr lang="en-US"/>
           </a:p>
@@ -1071,7 +1071,7 @@
           <a:p>
             <a:fld id="{F70BA417-99DB-4411-8639-E044FED67668}" type="datetimeFigureOut">
               <a:rPr lang="en-US" smtClean="0"/>
-              <a:t>5/15/2016</a:t>
+              <a:t>3/30/2017</a:t>
             </a:fld>
             <a:endParaRPr lang="en-US"/>
           </a:p>
@@ -1359,7 +1359,7 @@
           <a:p>
             <a:fld id="{F70BA417-99DB-4411-8639-E044FED67668}" type="datetimeFigureOut">
               <a:rPr lang="en-US" smtClean="0"/>
-              <a:t>5/15/2016</a:t>
+              <a:t>3/30/2017</a:t>
             </a:fld>
             <a:endParaRPr lang="en-US"/>
           </a:p>
@@ -1781,7 +1781,7 @@
           <a:p>
             <a:fld id="{F70BA417-99DB-4411-8639-E044FED67668}" type="datetimeFigureOut">
               <a:rPr lang="en-US" smtClean="0"/>
-              <a:t>5/15/2016</a:t>
+              <a:t>3/30/2017</a:t>
             </a:fld>
             <a:endParaRPr lang="en-US"/>
           </a:p>
@@ -1899,7 +1899,7 @@
           <a:p>
             <a:fld id="{F70BA417-99DB-4411-8639-E044FED67668}" type="datetimeFigureOut">
               <a:rPr lang="en-US" smtClean="0"/>
-              <a:t>5/15/2016</a:t>
+              <a:t>3/30/2017</a:t>
             </a:fld>
             <a:endParaRPr lang="en-US"/>
           </a:p>
@@ -1994,7 +1994,7 @@
           <a:p>
             <a:fld id="{F70BA417-99DB-4411-8639-E044FED67668}" type="datetimeFigureOut">
               <a:rPr lang="en-US" smtClean="0"/>
-              <a:t>5/15/2016</a:t>
+              <a:t>3/30/2017</a:t>
             </a:fld>
             <a:endParaRPr lang="en-US"/>
           </a:p>
@@ -2271,7 +2271,7 @@
           <a:p>
             <a:fld id="{F70BA417-99DB-4411-8639-E044FED67668}" type="datetimeFigureOut">
               <a:rPr lang="en-US" smtClean="0"/>
-              <a:t>5/15/2016</a:t>
+              <a:t>3/30/2017</a:t>
             </a:fld>
             <a:endParaRPr lang="en-US"/>
           </a:p>
@@ -2524,7 +2524,7 @@
           <a:p>
             <a:fld id="{F70BA417-99DB-4411-8639-E044FED67668}" type="datetimeFigureOut">
               <a:rPr lang="en-US" smtClean="0"/>
-              <a:t>5/15/2016</a:t>
+              <a:t>3/30/2017</a:t>
             </a:fld>
             <a:endParaRPr lang="en-US"/>
           </a:p>
@@ -2737,7 +2737,7 @@
           <a:p>
             <a:fld id="{F70BA417-99DB-4411-8639-E044FED67668}" type="datetimeFigureOut">
               <a:rPr lang="en-US" smtClean="0"/>
-              <a:t>5/15/2016</a:t>
+              <a:t>3/30/2017</a:t>
             </a:fld>
             <a:endParaRPr lang="en-US"/>
           </a:p>
@@ -18215,6 +18215,277 @@
           </p:txBody>
         </p:sp>
       </p:grpSp>
+      <p:grpSp>
+        <p:nvGrpSpPr>
+          <p:cNvPr id="127" name="Gruppieren 126"/>
+          <p:cNvGrpSpPr/>
+          <p:nvPr/>
+        </p:nvGrpSpPr>
+        <p:grpSpPr>
+          <a:xfrm>
+            <a:off x="7109783" y="3429000"/>
+            <a:ext cx="549990" cy="548969"/>
+            <a:chOff x="6688289" y="4339510"/>
+            <a:chExt cx="549990" cy="548969"/>
+          </a:xfrm>
+        </p:grpSpPr>
+        <p:sp>
+          <p:nvSpPr>
+            <p:cNvPr id="129" name="Rectangle 31"/>
+            <p:cNvSpPr/>
+            <p:nvPr/>
+          </p:nvSpPr>
+          <p:spPr>
+            <a:xfrm>
+              <a:off x="6688289" y="4339510"/>
+              <a:ext cx="549990" cy="548969"/>
+            </a:xfrm>
+            <a:prstGeom prst="rect">
+              <a:avLst/>
+            </a:prstGeom>
+            <a:noFill/>
+            <a:ln w="63500">
+              <a:solidFill>
+                <a:schemeClr val="tx1"/>
+              </a:solidFill>
+            </a:ln>
+          </p:spPr>
+          <p:style>
+            <a:lnRef idx="2">
+              <a:schemeClr val="accent1">
+                <a:shade val="50000"/>
+              </a:schemeClr>
+            </a:lnRef>
+            <a:fillRef idx="1">
+              <a:schemeClr val="accent1"/>
+            </a:fillRef>
+            <a:effectRef idx="0">
+              <a:schemeClr val="accent1"/>
+            </a:effectRef>
+            <a:fontRef idx="minor">
+              <a:schemeClr val="lt1"/>
+            </a:fontRef>
+          </p:style>
+          <p:txBody>
+            <a:bodyPr rtlCol="0" anchor="ctr"/>
+            <a:lstStyle/>
+            <a:p>
+              <a:pPr algn="ctr"/>
+              <a:endParaRPr lang="en-US"/>
+            </a:p>
+          </p:txBody>
+        </p:sp>
+        <p:cxnSp>
+          <p:nvCxnSpPr>
+            <p:cNvPr id="132" name="Gerader Verbinder 131"/>
+            <p:cNvCxnSpPr/>
+            <p:nvPr/>
+          </p:nvCxnSpPr>
+          <p:spPr>
+            <a:xfrm>
+              <a:off x="6688289" y="4606214"/>
+              <a:ext cx="549990" cy="0"/>
+            </a:xfrm>
+            <a:prstGeom prst="line">
+              <a:avLst/>
+            </a:prstGeom>
+            <a:ln w="25400">
+              <a:solidFill>
+                <a:schemeClr val="tx1"/>
+              </a:solidFill>
+            </a:ln>
+          </p:spPr>
+          <p:style>
+            <a:lnRef idx="1">
+              <a:schemeClr val="accent1"/>
+            </a:lnRef>
+            <a:fillRef idx="0">
+              <a:schemeClr val="accent1"/>
+            </a:fillRef>
+            <a:effectRef idx="0">
+              <a:schemeClr val="accent1"/>
+            </a:effectRef>
+            <a:fontRef idx="minor">
+              <a:schemeClr val="tx1"/>
+            </a:fontRef>
+          </p:style>
+        </p:cxnSp>
+        <p:cxnSp>
+          <p:nvCxnSpPr>
+            <p:cNvPr id="133" name="Gerader Verbinder 132"/>
+            <p:cNvCxnSpPr/>
+            <p:nvPr/>
+          </p:nvCxnSpPr>
+          <p:spPr>
+            <a:xfrm>
+              <a:off x="6688289" y="4509120"/>
+              <a:ext cx="549990" cy="0"/>
+            </a:xfrm>
+            <a:prstGeom prst="line">
+              <a:avLst/>
+            </a:prstGeom>
+            <a:ln w="25400">
+              <a:solidFill>
+                <a:schemeClr val="tx1"/>
+              </a:solidFill>
+            </a:ln>
+          </p:spPr>
+          <p:style>
+            <a:lnRef idx="1">
+              <a:schemeClr val="accent1"/>
+            </a:lnRef>
+            <a:fillRef idx="0">
+              <a:schemeClr val="accent1"/>
+            </a:fillRef>
+            <a:effectRef idx="0">
+              <a:schemeClr val="accent1"/>
+            </a:effectRef>
+            <a:fontRef idx="minor">
+              <a:schemeClr val="tx1"/>
+            </a:fontRef>
+          </p:style>
+        </p:cxnSp>
+        <p:cxnSp>
+          <p:nvCxnSpPr>
+            <p:cNvPr id="134" name="Gerader Verbinder 133"/>
+            <p:cNvCxnSpPr/>
+            <p:nvPr/>
+          </p:nvCxnSpPr>
+          <p:spPr>
+            <a:xfrm>
+              <a:off x="6688289" y="4428378"/>
+              <a:ext cx="549990" cy="0"/>
+            </a:xfrm>
+            <a:prstGeom prst="line">
+              <a:avLst/>
+            </a:prstGeom>
+            <a:ln w="25400">
+              <a:solidFill>
+                <a:schemeClr val="tx1"/>
+              </a:solidFill>
+            </a:ln>
+          </p:spPr>
+          <p:style>
+            <a:lnRef idx="1">
+              <a:schemeClr val="accent1"/>
+            </a:lnRef>
+            <a:fillRef idx="0">
+              <a:schemeClr val="accent1"/>
+            </a:fillRef>
+            <a:effectRef idx="0">
+              <a:schemeClr val="accent1"/>
+            </a:effectRef>
+            <a:fontRef idx="minor">
+              <a:schemeClr val="tx1"/>
+            </a:fontRef>
+          </p:style>
+        </p:cxnSp>
+        <p:cxnSp>
+          <p:nvCxnSpPr>
+            <p:cNvPr id="135" name="Gerader Verbinder 134"/>
+            <p:cNvCxnSpPr/>
+            <p:nvPr/>
+          </p:nvCxnSpPr>
+          <p:spPr>
+            <a:xfrm>
+              <a:off x="6688289" y="4699140"/>
+              <a:ext cx="549990" cy="0"/>
+            </a:xfrm>
+            <a:prstGeom prst="line">
+              <a:avLst/>
+            </a:prstGeom>
+            <a:ln w="25400">
+              <a:solidFill>
+                <a:schemeClr val="tx1"/>
+              </a:solidFill>
+            </a:ln>
+          </p:spPr>
+          <p:style>
+            <a:lnRef idx="1">
+              <a:schemeClr val="accent1"/>
+            </a:lnRef>
+            <a:fillRef idx="0">
+              <a:schemeClr val="accent1"/>
+            </a:fillRef>
+            <a:effectRef idx="0">
+              <a:schemeClr val="accent1"/>
+            </a:effectRef>
+            <a:fontRef idx="minor">
+              <a:schemeClr val="tx1"/>
+            </a:fontRef>
+          </p:style>
+        </p:cxnSp>
+        <p:cxnSp>
+          <p:nvCxnSpPr>
+            <p:cNvPr id="136" name="Gerader Verbinder 135"/>
+            <p:cNvCxnSpPr/>
+            <p:nvPr/>
+          </p:nvCxnSpPr>
+          <p:spPr>
+            <a:xfrm>
+              <a:off x="6688289" y="4786657"/>
+              <a:ext cx="549990" cy="0"/>
+            </a:xfrm>
+            <a:prstGeom prst="line">
+              <a:avLst/>
+            </a:prstGeom>
+            <a:ln w="25400">
+              <a:solidFill>
+                <a:schemeClr val="tx1"/>
+              </a:solidFill>
+            </a:ln>
+          </p:spPr>
+          <p:style>
+            <a:lnRef idx="1">
+              <a:schemeClr val="accent1"/>
+            </a:lnRef>
+            <a:fillRef idx="0">
+              <a:schemeClr val="accent1"/>
+            </a:fillRef>
+            <a:effectRef idx="0">
+              <a:schemeClr val="accent1"/>
+            </a:effectRef>
+            <a:fontRef idx="minor">
+              <a:schemeClr val="tx1"/>
+            </a:fontRef>
+          </p:style>
+        </p:cxnSp>
+        <p:cxnSp>
+          <p:nvCxnSpPr>
+            <p:cNvPr id="137" name="Gerader Verbinder 136"/>
+            <p:cNvCxnSpPr/>
+            <p:nvPr/>
+          </p:nvCxnSpPr>
+          <p:spPr>
+            <a:xfrm flipV="1">
+              <a:off x="6963284" y="4357148"/>
+              <a:ext cx="0" cy="531331"/>
+            </a:xfrm>
+            <a:prstGeom prst="line">
+              <a:avLst/>
+            </a:prstGeom>
+            <a:ln w="381000">
+              <a:solidFill>
+                <a:schemeClr val="tx1"/>
+              </a:solidFill>
+            </a:ln>
+          </p:spPr>
+          <p:style>
+            <a:lnRef idx="1">
+              <a:schemeClr val="accent1"/>
+            </a:lnRef>
+            <a:fillRef idx="0">
+              <a:schemeClr val="accent1"/>
+            </a:fillRef>
+            <a:effectRef idx="0">
+              <a:schemeClr val="accent1"/>
+            </a:effectRef>
+            <a:fontRef idx="minor">
+              <a:schemeClr val="tx1"/>
+            </a:fontRef>
+          </p:style>
+        </p:cxnSp>
+      </p:grpSp>
     </p:spTree>
     <p:extLst>
       <p:ext uri="{BB962C8B-B14F-4D97-AF65-F5344CB8AC3E}">

</xml_diff>